<commit_message>
moved figure around a bit
</commit_message>
<xml_diff>
--- a/docs/Figure3_draft_JR.pptx
+++ b/docs/Figure3_draft_JR.pptx
@@ -104,6 +104,11 @@
       </a:defRPr>
     </a:lvl9pPr>
   </p:defaultTextStyle>
+  <p:extLst>
+    <p:ext uri="{EFAFB233-063F-42B5-8137-9DF3F51BA10A}">
+      <p15:sldGuideLst xmlns:p15="http://schemas.microsoft.com/office/powerpoint/2012/main"/>
+    </p:ext>
+  </p:extLst>
 </p:presentation>
 </file>
 
@@ -3477,7 +3482,7 @@
                 <a:ea typeface="Calibri" panose="020F0502020204030204" pitchFamily="34" charset="0"/>
                 <a:cs typeface="Times New Roman" panose="02020603050405020304" pitchFamily="18" charset="0"/>
               </a:rPr>
-              <a:t>         Pgp3 MBA                          CT694                                  LFA Latex                             LFA Gold                                       LFA Field</a:t>
+              <a:t>                Pgp3 MBA                             CT694                               LFA Latex                             LFA Gold                                       LFA Field</a:t>
             </a:r>
             <a:endParaRPr kumimoji="0" lang="en-US" altLang="en-US" sz="1400" b="1" i="0" u="none" strike="noStrike" cap="none" normalizeH="0" baseline="0" dirty="0">
               <a:ln>
@@ -4870,7 +4875,7 @@
         </p:blipFill>
         <p:spPr>
           <a:xfrm>
-            <a:off x="1362059" y="1481471"/>
+            <a:off x="1373119" y="1614495"/>
             <a:ext cx="1720941" cy="955156"/>
           </a:xfrm>
           <a:prstGeom prst="rect">
@@ -4910,7 +4915,7 @@
         </p:blipFill>
         <p:spPr>
           <a:xfrm>
-            <a:off x="1362059" y="2702481"/>
+            <a:off x="1373120" y="2735884"/>
             <a:ext cx="1720941" cy="955156"/>
           </a:xfrm>
           <a:prstGeom prst="rect">
@@ -5030,7 +5035,7 @@
         </p:blipFill>
         <p:spPr>
           <a:xfrm>
-            <a:off x="3191277" y="1500900"/>
+            <a:off x="3197008" y="1612745"/>
             <a:ext cx="1720941" cy="955156"/>
           </a:xfrm>
           <a:prstGeom prst="rect">
@@ -5070,7 +5075,7 @@
         </p:blipFill>
         <p:spPr>
           <a:xfrm>
-            <a:off x="3185343" y="2684651"/>
+            <a:off x="3191277" y="2741816"/>
             <a:ext cx="1720941" cy="955156"/>
           </a:xfrm>
           <a:prstGeom prst="rect">
@@ -5190,7 +5195,7 @@
         </p:blipFill>
         <p:spPr>
           <a:xfrm>
-            <a:off x="4997548" y="1499826"/>
+            <a:off x="5020897" y="1612745"/>
             <a:ext cx="1720941" cy="955156"/>
           </a:xfrm>
           <a:prstGeom prst="rect">
@@ -5230,7 +5235,7 @@
         </p:blipFill>
         <p:spPr>
           <a:xfrm>
-            <a:off x="4997548" y="2684651"/>
+            <a:off x="5020897" y="2744917"/>
             <a:ext cx="1720941" cy="955156"/>
           </a:xfrm>
           <a:prstGeom prst="rect">
@@ -5270,7 +5275,7 @@
         </p:blipFill>
         <p:spPr>
           <a:xfrm>
-            <a:off x="4997548" y="3884016"/>
+            <a:off x="4994773" y="3880145"/>
             <a:ext cx="1720941" cy="955156"/>
           </a:xfrm>
           <a:prstGeom prst="rect">
@@ -5350,7 +5355,7 @@
         </p:blipFill>
         <p:spPr>
           <a:xfrm>
-            <a:off x="6809795" y="3876846"/>
+            <a:off x="6815686" y="3877295"/>
             <a:ext cx="1720941" cy="955156"/>
           </a:xfrm>
           <a:prstGeom prst="rect">
@@ -5390,7 +5395,7 @@
         </p:blipFill>
         <p:spPr>
           <a:xfrm>
-            <a:off x="8621957" y="3861851"/>
+            <a:off x="8633824" y="3877295"/>
             <a:ext cx="1720941" cy="955156"/>
           </a:xfrm>
           <a:prstGeom prst="rect">
@@ -5470,7 +5475,7 @@
         </p:blipFill>
         <p:spPr>
           <a:xfrm>
-            <a:off x="8622022" y="4999959"/>
+            <a:off x="8633824" y="4999959"/>
             <a:ext cx="1720941" cy="955156"/>
           </a:xfrm>
           <a:prstGeom prst="rect">

</xml_diff>

<commit_message>
updated plots and fuigures per DM feedback
</commit_message>
<xml_diff>
--- a/docs/Figure3_draft_JR.pptx
+++ b/docs/Figure3_draft_JR.pptx
@@ -259,7 +259,7 @@
           <a:p>
             <a:fld id="{F0A330B3-BC67-49E1-B664-0390434B4135}" type="datetimeFigureOut">
               <a:rPr lang="en-US" smtClean="0"/>
-              <a:t>5/11/2020</a:t>
+              <a:t>5/13/2020</a:t>
             </a:fld>
             <a:endParaRPr lang="en-US"/>
           </a:p>
@@ -457,7 +457,7 @@
           <a:p>
             <a:fld id="{F0A330B3-BC67-49E1-B664-0390434B4135}" type="datetimeFigureOut">
               <a:rPr lang="en-US" smtClean="0"/>
-              <a:t>5/11/2020</a:t>
+              <a:t>5/13/2020</a:t>
             </a:fld>
             <a:endParaRPr lang="en-US"/>
           </a:p>
@@ -665,7 +665,7 @@
           <a:p>
             <a:fld id="{F0A330B3-BC67-49E1-B664-0390434B4135}" type="datetimeFigureOut">
               <a:rPr lang="en-US" smtClean="0"/>
-              <a:t>5/11/2020</a:t>
+              <a:t>5/13/2020</a:t>
             </a:fld>
             <a:endParaRPr lang="en-US"/>
           </a:p>
@@ -863,7 +863,7 @@
           <a:p>
             <a:fld id="{F0A330B3-BC67-49E1-B664-0390434B4135}" type="datetimeFigureOut">
               <a:rPr lang="en-US" smtClean="0"/>
-              <a:t>5/11/2020</a:t>
+              <a:t>5/13/2020</a:t>
             </a:fld>
             <a:endParaRPr lang="en-US"/>
           </a:p>
@@ -1138,7 +1138,7 @@
           <a:p>
             <a:fld id="{F0A330B3-BC67-49E1-B664-0390434B4135}" type="datetimeFigureOut">
               <a:rPr lang="en-US" smtClean="0"/>
-              <a:t>5/11/2020</a:t>
+              <a:t>5/13/2020</a:t>
             </a:fld>
             <a:endParaRPr lang="en-US"/>
           </a:p>
@@ -1403,7 +1403,7 @@
           <a:p>
             <a:fld id="{F0A330B3-BC67-49E1-B664-0390434B4135}" type="datetimeFigureOut">
               <a:rPr lang="en-US" smtClean="0"/>
-              <a:t>5/11/2020</a:t>
+              <a:t>5/13/2020</a:t>
             </a:fld>
             <a:endParaRPr lang="en-US"/>
           </a:p>
@@ -1815,7 +1815,7 @@
           <a:p>
             <a:fld id="{F0A330B3-BC67-49E1-B664-0390434B4135}" type="datetimeFigureOut">
               <a:rPr lang="en-US" smtClean="0"/>
-              <a:t>5/11/2020</a:t>
+              <a:t>5/13/2020</a:t>
             </a:fld>
             <a:endParaRPr lang="en-US"/>
           </a:p>
@@ -1956,7 +1956,7 @@
           <a:p>
             <a:fld id="{F0A330B3-BC67-49E1-B664-0390434B4135}" type="datetimeFigureOut">
               <a:rPr lang="en-US" smtClean="0"/>
-              <a:t>5/11/2020</a:t>
+              <a:t>5/13/2020</a:t>
             </a:fld>
             <a:endParaRPr lang="en-US"/>
           </a:p>
@@ -2069,7 +2069,7 @@
           <a:p>
             <a:fld id="{F0A330B3-BC67-49E1-B664-0390434B4135}" type="datetimeFigureOut">
               <a:rPr lang="en-US" smtClean="0"/>
-              <a:t>5/11/2020</a:t>
+              <a:t>5/13/2020</a:t>
             </a:fld>
             <a:endParaRPr lang="en-US"/>
           </a:p>
@@ -2380,7 +2380,7 @@
           <a:p>
             <a:fld id="{F0A330B3-BC67-49E1-B664-0390434B4135}" type="datetimeFigureOut">
               <a:rPr lang="en-US" smtClean="0"/>
-              <a:t>5/11/2020</a:t>
+              <a:t>5/13/2020</a:t>
             </a:fld>
             <a:endParaRPr lang="en-US"/>
           </a:p>
@@ -2668,7 +2668,7 @@
           <a:p>
             <a:fld id="{F0A330B3-BC67-49E1-B664-0390434B4135}" type="datetimeFigureOut">
               <a:rPr lang="en-US" smtClean="0"/>
-              <a:t>5/11/2020</a:t>
+              <a:t>5/13/2020</a:t>
             </a:fld>
             <a:endParaRPr lang="en-US"/>
           </a:p>
@@ -2909,7 +2909,7 @@
           <a:p>
             <a:fld id="{F0A330B3-BC67-49E1-B664-0390434B4135}" type="datetimeFigureOut">
               <a:rPr lang="en-US" smtClean="0"/>
-              <a:t>5/11/2020</a:t>
+              <a:t>5/13/2020</a:t>
             </a:fld>
             <a:endParaRPr lang="en-US"/>
           </a:p>
@@ -3342,8 +3342,8 @@
         </p:nvCxnSpPr>
         <p:spPr>
           <a:xfrm>
-            <a:off x="1174837" y="1069740"/>
-            <a:ext cx="0" cy="5075963"/>
+            <a:off x="1042635" y="457200"/>
+            <a:ext cx="0" cy="6118094"/>
           </a:xfrm>
           <a:prstGeom prst="line">
             <a:avLst/>
@@ -3381,8 +3381,8 @@
         </p:nvCxnSpPr>
         <p:spPr>
           <a:xfrm flipH="1">
-            <a:off x="1160296" y="6088246"/>
-            <a:ext cx="9375353" cy="25558"/>
+            <a:off x="1042636" y="6575294"/>
+            <a:ext cx="10646260" cy="3967"/>
           </a:xfrm>
           <a:prstGeom prst="line">
             <a:avLst/>
@@ -3420,8 +3420,8 @@
         </p:nvSpPr>
         <p:spPr bwMode="auto">
           <a:xfrm>
-            <a:off x="1160296" y="902327"/>
-            <a:ext cx="9929619" cy="418250"/>
+            <a:off x="1148180" y="103164"/>
+            <a:ext cx="10315752" cy="418250"/>
           </a:xfrm>
           <a:prstGeom prst="rect">
             <a:avLst/>
@@ -3482,7 +3482,7 @@
                 <a:ea typeface="Calibri" panose="020F0502020204030204" pitchFamily="34" charset="0"/>
                 <a:cs typeface="Times New Roman" panose="02020603050405020304" pitchFamily="18" charset="0"/>
               </a:rPr>
-              <a:t>                Pgp3 MBA                             CT694                               LFA Latex                             LFA Gold                                       LFA Field</a:t>
+              <a:t>                    Pgp3 MBA                                      CT694                                        LFA Latex                             LFA Gold                                       LFA Field</a:t>
             </a:r>
             <a:endParaRPr kumimoji="0" lang="en-US" altLang="en-US" sz="1400" b="1" i="0" u="none" strike="noStrike" cap="none" normalizeH="0" baseline="0" dirty="0">
               <a:ln>
@@ -3540,8 +3540,8 @@
         </p:nvSpPr>
         <p:spPr bwMode="auto">
           <a:xfrm>
-            <a:off x="99335" y="1069740"/>
-            <a:ext cx="845981" cy="5517497"/>
+            <a:off x="17639" y="521415"/>
+            <a:ext cx="763905" cy="6316660"/>
           </a:xfrm>
           <a:prstGeom prst="rect">
             <a:avLst/>
@@ -3642,7 +3642,7 @@
               <a:buNone/>
               <a:tabLst/>
             </a:pPr>
-            <a:endParaRPr kumimoji="0" lang="en-US" altLang="en-US" sz="1100" b="0" i="0" u="none" strike="noStrike" cap="none" normalizeH="0" baseline="0" dirty="0">
+            <a:endParaRPr kumimoji="0" lang="en-US" altLang="en-US" sz="1050" b="0" i="0" u="none" strike="noStrike" cap="none" normalizeH="0" baseline="0" dirty="0">
               <a:ln>
                 <a:noFill/>
               </a:ln>
@@ -3672,7 +3672,7 @@
               <a:buNone/>
               <a:tabLst/>
             </a:pPr>
-            <a:endParaRPr lang="en-US" altLang="en-US" sz="1400" b="1" dirty="0">
+            <a:endParaRPr lang="en-US" altLang="en-US" sz="1200" b="1" dirty="0">
               <a:latin typeface="Calibri" panose="020F0502020204030204" pitchFamily="34" charset="0"/>
               <a:ea typeface="Calibri" panose="020F0502020204030204" pitchFamily="34" charset="0"/>
               <a:cs typeface="Times New Roman" panose="02020603050405020304" pitchFamily="18" charset="0"/>
@@ -3696,7 +3696,7 @@
               <a:tabLst/>
             </a:pPr>
             <a:r>
-              <a:rPr kumimoji="0" lang="en-US" altLang="en-US" sz="1400" b="1" i="0" u="none" strike="noStrike" cap="none" normalizeH="0" baseline="0" dirty="0" err="1">
+              <a:rPr kumimoji="0" lang="en-US" altLang="en-US" sz="1200" b="1" i="0" u="none" strike="noStrike" cap="none" normalizeH="0" baseline="0" dirty="0" err="1">
                 <a:ln>
                   <a:noFill/>
                 </a:ln>
@@ -3710,7 +3710,7 @@
               </a:rPr>
               <a:t>Manono</a:t>
             </a:r>
-            <a:endParaRPr kumimoji="0" lang="en-US" altLang="en-US" sz="1400" b="1" i="0" u="none" strike="noStrike" cap="none" normalizeH="0" baseline="0" dirty="0">
+            <a:endParaRPr kumimoji="0" lang="en-US" altLang="en-US" sz="1200" b="1" i="0" u="none" strike="noStrike" cap="none" normalizeH="0" baseline="0" dirty="0">
               <a:ln>
                 <a:noFill/>
               </a:ln>
@@ -3740,7 +3740,7 @@
               <a:buNone/>
               <a:tabLst/>
             </a:pPr>
-            <a:endParaRPr lang="en-US" altLang="en-US" sz="1400" b="1" dirty="0">
+            <a:endParaRPr lang="en-US" altLang="en-US" sz="1200" b="1" dirty="0">
               <a:latin typeface="Calibri" panose="020F0502020204030204" pitchFamily="34" charset="0"/>
               <a:cs typeface="Times New Roman" panose="02020603050405020304" pitchFamily="18" charset="0"/>
             </a:endParaRPr>
@@ -3762,7 +3762,7 @@
               <a:buNone/>
               <a:tabLst/>
             </a:pPr>
-            <a:endParaRPr kumimoji="0" lang="en-US" altLang="en-US" sz="1400" b="1" i="0" u="none" strike="noStrike" cap="none" normalizeH="0" baseline="0" dirty="0">
+            <a:endParaRPr kumimoji="0" lang="en-US" altLang="en-US" sz="1200" b="1" i="0" u="none" strike="noStrike" cap="none" normalizeH="0" baseline="0" dirty="0">
               <a:ln>
                 <a:noFill/>
               </a:ln>
@@ -3791,7 +3791,7 @@
               <a:buNone/>
               <a:tabLst/>
             </a:pPr>
-            <a:endParaRPr lang="en-US" altLang="en-US" sz="1400" b="1" dirty="0">
+            <a:endParaRPr lang="en-US" altLang="en-US" sz="1200" b="1" dirty="0">
               <a:latin typeface="Calibri" panose="020F0502020204030204" pitchFamily="34" charset="0"/>
               <a:cs typeface="Times New Roman" panose="02020603050405020304" pitchFamily="18" charset="0"/>
             </a:endParaRPr>
@@ -3813,7 +3813,7 @@
               <a:buNone/>
               <a:tabLst/>
             </a:pPr>
-            <a:endParaRPr lang="en-US" altLang="en-US" sz="1000" b="1" dirty="0"/>
+            <a:endParaRPr lang="en-US" altLang="en-US" sz="900" b="1" dirty="0"/>
           </a:p>
           <a:p>
             <a:pPr marL="0" marR="0" lvl="0" indent="0" algn="l" defTabSz="914400" rtl="0" eaLnBrk="0" fontAlgn="base" latinLnBrk="0" hangingPunct="0">
@@ -3832,7 +3832,45 @@
               <a:buNone/>
               <a:tabLst/>
             </a:pPr>
-            <a:endParaRPr kumimoji="0" lang="en-US" altLang="en-US" sz="1000" b="1" i="0" u="none" strike="noStrike" cap="none" normalizeH="0" baseline="0" dirty="0">
+            <a:endParaRPr lang="en-US" altLang="en-US" sz="900" b="1" dirty="0"/>
+          </a:p>
+          <a:p>
+            <a:pPr marL="0" marR="0" lvl="0" indent="0" algn="l" defTabSz="914400" rtl="0" eaLnBrk="0" fontAlgn="base" latinLnBrk="0" hangingPunct="0">
+              <a:lnSpc>
+                <a:spcPct val="100000"/>
+              </a:lnSpc>
+              <a:spcBef>
+                <a:spcPct val="0"/>
+              </a:spcBef>
+              <a:spcAft>
+                <a:spcPct val="0"/>
+              </a:spcAft>
+              <a:buClrTx/>
+              <a:buSzTx/>
+              <a:buFontTx/>
+              <a:buNone/>
+              <a:tabLst/>
+            </a:pPr>
+            <a:endParaRPr lang="en-US" altLang="en-US" sz="900" b="1" dirty="0"/>
+          </a:p>
+          <a:p>
+            <a:pPr marL="0" marR="0" lvl="0" indent="0" algn="l" defTabSz="914400" rtl="0" eaLnBrk="0" fontAlgn="base" latinLnBrk="0" hangingPunct="0">
+              <a:lnSpc>
+                <a:spcPct val="100000"/>
+              </a:lnSpc>
+              <a:spcBef>
+                <a:spcPct val="0"/>
+              </a:spcBef>
+              <a:spcAft>
+                <a:spcPct val="0"/>
+              </a:spcAft>
+              <a:buClrTx/>
+              <a:buSzTx/>
+              <a:buFontTx/>
+              <a:buNone/>
+              <a:tabLst/>
+            </a:pPr>
+            <a:endParaRPr kumimoji="0" lang="en-US" altLang="en-US" sz="900" b="1" i="0" u="none" strike="noStrike" cap="none" normalizeH="0" baseline="0" dirty="0">
               <a:ln>
                 <a:noFill/>
               </a:ln>
@@ -3859,7 +3897,7 @@
               <a:buNone/>
               <a:tabLst/>
             </a:pPr>
-            <a:endParaRPr kumimoji="0" lang="en-US" altLang="en-US" sz="1400" b="1" i="0" u="none" strike="noStrike" cap="none" normalizeH="0" baseline="0" dirty="0">
+            <a:endParaRPr kumimoji="0" lang="en-US" altLang="en-US" sz="1200" b="1" i="0" u="none" strike="noStrike" cap="none" normalizeH="0" baseline="0" dirty="0">
               <a:ln>
                 <a:noFill/>
               </a:ln>
@@ -3890,7 +3928,7 @@
               <a:tabLst/>
             </a:pPr>
             <a:r>
-              <a:rPr kumimoji="0" lang="en-US" altLang="en-US" sz="1400" b="1" i="0" u="none" strike="noStrike" cap="none" normalizeH="0" baseline="0" dirty="0" err="1">
+              <a:rPr kumimoji="0" lang="en-US" altLang="en-US" sz="1200" b="1" i="0" u="none" strike="noStrike" cap="none" normalizeH="0" baseline="0" dirty="0" err="1">
                 <a:ln>
                   <a:noFill/>
                 </a:ln>
@@ -3904,7 +3942,7 @@
               </a:rPr>
               <a:t>Nyemba</a:t>
             </a:r>
-            <a:endParaRPr kumimoji="0" lang="en-US" altLang="en-US" sz="1400" b="1" i="0" u="none" strike="noStrike" cap="none" normalizeH="0" baseline="0" dirty="0">
+            <a:endParaRPr kumimoji="0" lang="en-US" altLang="en-US" sz="1200" b="1" i="0" u="none" strike="noStrike" cap="none" normalizeH="0" baseline="0" dirty="0">
               <a:ln>
                 <a:noFill/>
               </a:ln>
@@ -3934,7 +3972,7 @@
               <a:buNone/>
               <a:tabLst/>
             </a:pPr>
-            <a:endParaRPr lang="en-US" altLang="en-US" sz="1400" b="1" dirty="0">
+            <a:endParaRPr lang="en-US" altLang="en-US" sz="1200" b="1" dirty="0">
               <a:latin typeface="Calibri" panose="020F0502020204030204" pitchFamily="34" charset="0"/>
               <a:cs typeface="Times New Roman" panose="02020603050405020304" pitchFamily="18" charset="0"/>
             </a:endParaRPr>
@@ -3956,7 +3994,7 @@
               <a:buNone/>
               <a:tabLst/>
             </a:pPr>
-            <a:endParaRPr kumimoji="0" lang="en-US" altLang="en-US" sz="1400" b="1" i="0" u="none" strike="noStrike" cap="none" normalizeH="0" baseline="0" dirty="0">
+            <a:endParaRPr kumimoji="0" lang="en-US" altLang="en-US" sz="1200" b="1" i="0" u="none" strike="noStrike" cap="none" normalizeH="0" baseline="0" dirty="0">
               <a:ln>
                 <a:noFill/>
               </a:ln>
@@ -3985,7 +4023,7 @@
               <a:buNone/>
               <a:tabLst/>
             </a:pPr>
-            <a:endParaRPr kumimoji="0" lang="en-US" altLang="en-US" sz="1400" b="1" i="0" u="none" strike="noStrike" cap="none" normalizeH="0" baseline="0" dirty="0">
+            <a:endParaRPr kumimoji="0" lang="en-US" altLang="en-US" sz="1200" b="1" i="0" u="none" strike="noStrike" cap="none" normalizeH="0" baseline="0" dirty="0">
               <a:ln>
                 <a:noFill/>
               </a:ln>
@@ -4015,7 +4053,7 @@
               <a:buNone/>
               <a:tabLst/>
             </a:pPr>
-            <a:endParaRPr lang="en-US" altLang="en-US" sz="1400" b="1" dirty="0">
+            <a:endParaRPr lang="en-US" altLang="en-US" sz="1200" b="1" dirty="0">
               <a:latin typeface="Calibri" panose="020F0502020204030204" pitchFamily="34" charset="0"/>
               <a:ea typeface="Calibri" panose="020F0502020204030204" pitchFamily="34" charset="0"/>
               <a:cs typeface="Times New Roman" panose="02020603050405020304" pitchFamily="18" charset="0"/>
@@ -4038,7 +4076,7 @@
               <a:buNone/>
               <a:tabLst/>
             </a:pPr>
-            <a:endParaRPr lang="en-US" altLang="en-US" sz="1400" b="1" dirty="0">
+            <a:endParaRPr lang="en-US" altLang="en-US" sz="1200" b="1" dirty="0">
               <a:latin typeface="Calibri" panose="020F0502020204030204" pitchFamily="34" charset="0"/>
               <a:ea typeface="Calibri" panose="020F0502020204030204" pitchFamily="34" charset="0"/>
               <a:cs typeface="Times New Roman" panose="02020603050405020304" pitchFamily="18" charset="0"/>
@@ -4061,8 +4099,77 @@
               <a:buNone/>
               <a:tabLst/>
             </a:pPr>
-            <a:r>
-              <a:rPr kumimoji="0" lang="en-US" altLang="en-US" sz="1400" b="1" i="0" u="none" strike="noStrike" cap="none" normalizeH="0" baseline="0" dirty="0" err="1">
+            <a:endParaRPr lang="en-US" altLang="en-US" sz="1200" b="1" dirty="0">
+              <a:latin typeface="Calibri" panose="020F0502020204030204" pitchFamily="34" charset="0"/>
+              <a:ea typeface="Calibri" panose="020F0502020204030204" pitchFamily="34" charset="0"/>
+              <a:cs typeface="Times New Roman" panose="02020603050405020304" pitchFamily="18" charset="0"/>
+            </a:endParaRPr>
+          </a:p>
+          <a:p>
+            <a:pPr marL="0" marR="0" lvl="0" indent="0" algn="l" defTabSz="914400" rtl="0" eaLnBrk="0" fontAlgn="base" latinLnBrk="0" hangingPunct="0">
+              <a:lnSpc>
+                <a:spcPct val="100000"/>
+              </a:lnSpc>
+              <a:spcBef>
+                <a:spcPct val="0"/>
+              </a:spcBef>
+              <a:spcAft>
+                <a:spcPct val="0"/>
+              </a:spcAft>
+              <a:buClrTx/>
+              <a:buSzTx/>
+              <a:buFontTx/>
+              <a:buNone/>
+              <a:tabLst/>
+            </a:pPr>
+            <a:endParaRPr lang="en-US" altLang="en-US" sz="1200" b="1" dirty="0">
+              <a:latin typeface="Calibri" panose="020F0502020204030204" pitchFamily="34" charset="0"/>
+              <a:ea typeface="Calibri" panose="020F0502020204030204" pitchFamily="34" charset="0"/>
+              <a:cs typeface="Times New Roman" panose="02020603050405020304" pitchFamily="18" charset="0"/>
+            </a:endParaRPr>
+          </a:p>
+          <a:p>
+            <a:pPr marL="0" marR="0" lvl="0" indent="0" algn="l" defTabSz="914400" rtl="0" eaLnBrk="0" fontAlgn="base" latinLnBrk="0" hangingPunct="0">
+              <a:lnSpc>
+                <a:spcPct val="100000"/>
+              </a:lnSpc>
+              <a:spcBef>
+                <a:spcPct val="0"/>
+              </a:spcBef>
+              <a:spcAft>
+                <a:spcPct val="0"/>
+              </a:spcAft>
+              <a:buClrTx/>
+              <a:buSzTx/>
+              <a:buFontTx/>
+              <a:buNone/>
+              <a:tabLst/>
+            </a:pPr>
+            <a:endParaRPr lang="en-US" altLang="en-US" sz="1200" b="1" dirty="0">
+              <a:latin typeface="Calibri" panose="020F0502020204030204" pitchFamily="34" charset="0"/>
+              <a:ea typeface="Calibri" panose="020F0502020204030204" pitchFamily="34" charset="0"/>
+              <a:cs typeface="Times New Roman" panose="02020603050405020304" pitchFamily="18" charset="0"/>
+            </a:endParaRPr>
+          </a:p>
+          <a:p>
+            <a:pPr marL="0" marR="0" lvl="0" indent="0" algn="l" defTabSz="914400" rtl="0" eaLnBrk="0" fontAlgn="base" latinLnBrk="0" hangingPunct="0">
+              <a:lnSpc>
+                <a:spcPct val="100000"/>
+              </a:lnSpc>
+              <a:spcBef>
+                <a:spcPct val="0"/>
+              </a:spcBef>
+              <a:spcAft>
+                <a:spcPct val="0"/>
+              </a:spcAft>
+              <a:buClrTx/>
+              <a:buSzTx/>
+              <a:buFontTx/>
+              <a:buNone/>
+              <a:tabLst/>
+            </a:pPr>
+            <a:r>
+              <a:rPr kumimoji="0" lang="en-US" altLang="en-US" sz="1200" b="1" i="0" u="none" strike="noStrike" cap="none" normalizeH="0" baseline="0" dirty="0" err="1">
                 <a:ln>
                   <a:noFill/>
                 </a:ln>
@@ -4076,7 +4183,7 @@
               </a:rPr>
               <a:t>Keran</a:t>
             </a:r>
-            <a:endParaRPr kumimoji="0" lang="en-US" altLang="en-US" sz="1400" b="1" i="0" u="none" strike="noStrike" cap="none" normalizeH="0" baseline="0" dirty="0">
+            <a:endParaRPr kumimoji="0" lang="en-US" altLang="en-US" sz="1200" b="1" i="0" u="none" strike="noStrike" cap="none" normalizeH="0" baseline="0" dirty="0">
               <a:ln>
                 <a:noFill/>
               </a:ln>
@@ -4106,7 +4213,7 @@
               <a:buNone/>
               <a:tabLst/>
             </a:pPr>
-            <a:endParaRPr lang="en-US" altLang="en-US" sz="1400" b="1" dirty="0">
+            <a:endParaRPr lang="en-US" altLang="en-US" sz="1200" b="1" dirty="0">
               <a:latin typeface="Calibri" panose="020F0502020204030204" pitchFamily="34" charset="0"/>
               <a:cs typeface="Times New Roman" panose="02020603050405020304" pitchFamily="18" charset="0"/>
             </a:endParaRPr>
@@ -4128,7 +4235,7 @@
               <a:buNone/>
               <a:tabLst/>
             </a:pPr>
-            <a:endParaRPr kumimoji="0" lang="en-US" altLang="en-US" sz="1400" b="1" i="0" u="none" strike="noStrike" cap="none" normalizeH="0" baseline="0" dirty="0">
+            <a:endParaRPr kumimoji="0" lang="en-US" altLang="en-US" sz="1200" b="1" i="0" u="none" strike="noStrike" cap="none" normalizeH="0" baseline="0" dirty="0">
               <a:ln>
                 <a:noFill/>
               </a:ln>
@@ -4157,7 +4264,7 @@
               <a:buNone/>
               <a:tabLst/>
             </a:pPr>
-            <a:endParaRPr kumimoji="0" lang="en-US" altLang="en-US" sz="1400" b="1" i="0" u="none" strike="noStrike" cap="none" normalizeH="0" baseline="0" dirty="0">
+            <a:endParaRPr kumimoji="0" lang="en-US" altLang="en-US" sz="1200" b="1" i="0" u="none" strike="noStrike" cap="none" normalizeH="0" baseline="0" dirty="0">
               <a:ln>
                 <a:noFill/>
               </a:ln>
@@ -4186,7 +4293,80 @@
               <a:buNone/>
               <a:tabLst/>
             </a:pPr>
-            <a:endParaRPr kumimoji="0" lang="en-US" altLang="en-US" sz="1000" b="1" i="0" u="none" strike="noStrike" cap="none" normalizeH="0" baseline="0" dirty="0">
+            <a:endParaRPr lang="en-US" altLang="en-US" sz="1200" b="1" dirty="0">
+              <a:latin typeface="Calibri" panose="020F0502020204030204" pitchFamily="34" charset="0"/>
+              <a:cs typeface="Times New Roman" panose="02020603050405020304" pitchFamily="18" charset="0"/>
+            </a:endParaRPr>
+          </a:p>
+          <a:p>
+            <a:pPr marL="0" marR="0" lvl="0" indent="0" algn="l" defTabSz="914400" rtl="0" eaLnBrk="0" fontAlgn="base" latinLnBrk="0" hangingPunct="0">
+              <a:lnSpc>
+                <a:spcPct val="100000"/>
+              </a:lnSpc>
+              <a:spcBef>
+                <a:spcPct val="0"/>
+              </a:spcBef>
+              <a:spcAft>
+                <a:spcPct val="0"/>
+              </a:spcAft>
+              <a:buClrTx/>
+              <a:buSzTx/>
+              <a:buFontTx/>
+              <a:buNone/>
+              <a:tabLst/>
+            </a:pPr>
+            <a:endParaRPr lang="en-US" altLang="en-US" sz="1200" b="1" dirty="0">
+              <a:latin typeface="Calibri" panose="020F0502020204030204" pitchFamily="34" charset="0"/>
+              <a:cs typeface="Times New Roman" panose="02020603050405020304" pitchFamily="18" charset="0"/>
+            </a:endParaRPr>
+          </a:p>
+          <a:p>
+            <a:pPr marL="0" marR="0" lvl="0" indent="0" algn="l" defTabSz="914400" rtl="0" eaLnBrk="0" fontAlgn="base" latinLnBrk="0" hangingPunct="0">
+              <a:lnSpc>
+                <a:spcPct val="100000"/>
+              </a:lnSpc>
+              <a:spcBef>
+                <a:spcPct val="0"/>
+              </a:spcBef>
+              <a:spcAft>
+                <a:spcPct val="0"/>
+              </a:spcAft>
+              <a:buClrTx/>
+              <a:buSzTx/>
+              <a:buFontTx/>
+              <a:buNone/>
+              <a:tabLst/>
+            </a:pPr>
+            <a:endParaRPr kumimoji="0" lang="en-US" altLang="en-US" sz="1200" b="1" i="0" u="none" strike="noStrike" cap="none" normalizeH="0" baseline="0" dirty="0">
+              <a:ln>
+                <a:noFill/>
+              </a:ln>
+              <a:solidFill>
+                <a:schemeClr val="tx1"/>
+              </a:solidFill>
+              <a:effectLst/>
+              <a:latin typeface="Calibri" panose="020F0502020204030204" pitchFamily="34" charset="0"/>
+              <a:cs typeface="Times New Roman" panose="02020603050405020304" pitchFamily="18" charset="0"/>
+            </a:endParaRPr>
+          </a:p>
+          <a:p>
+            <a:pPr marL="0" marR="0" lvl="0" indent="0" algn="l" defTabSz="914400" rtl="0" eaLnBrk="0" fontAlgn="base" latinLnBrk="0" hangingPunct="0">
+              <a:lnSpc>
+                <a:spcPct val="100000"/>
+              </a:lnSpc>
+              <a:spcBef>
+                <a:spcPct val="0"/>
+              </a:spcBef>
+              <a:spcAft>
+                <a:spcPct val="0"/>
+              </a:spcAft>
+              <a:buClrTx/>
+              <a:buSzTx/>
+              <a:buFontTx/>
+              <a:buNone/>
+              <a:tabLst/>
+            </a:pPr>
+            <a:endParaRPr kumimoji="0" lang="en-US" altLang="en-US" sz="900" b="1" i="0" u="none" strike="noStrike" cap="none" normalizeH="0" baseline="0" dirty="0">
               <a:ln>
                 <a:noFill/>
               </a:ln>
@@ -4214,7 +4394,7 @@
               <a:tabLst/>
             </a:pPr>
             <a:r>
-              <a:rPr kumimoji="0" lang="en-US" altLang="en-US" sz="1400" b="1" i="0" u="none" strike="noStrike" cap="none" normalizeH="0" baseline="0" dirty="0" err="1">
+              <a:rPr kumimoji="0" lang="en-US" altLang="en-US" sz="1200" b="1" i="0" u="none" strike="noStrike" cap="none" normalizeH="0" baseline="0" dirty="0" err="1">
                 <a:ln>
                   <a:noFill/>
                 </a:ln>
@@ -4228,7 +4408,7 @@
               </a:rPr>
               <a:t>Anie</a:t>
             </a:r>
-            <a:endParaRPr kumimoji="0" lang="en-US" altLang="en-US" sz="1800" b="1" i="0" u="none" strike="noStrike" cap="none" normalizeH="0" baseline="0" dirty="0">
+            <a:endParaRPr kumimoji="0" lang="en-US" altLang="en-US" sz="1600" b="1" i="0" u="none" strike="noStrike" cap="none" normalizeH="0" baseline="0" dirty="0">
               <a:ln>
                 <a:noFill/>
               </a:ln>
@@ -4257,30 +4437,16 @@
         </p:nvSpPr>
         <p:spPr bwMode="auto">
           <a:xfrm>
-            <a:off x="4886535" y="6274699"/>
+            <a:off x="5296056" y="6581112"/>
             <a:ext cx="1304945" cy="273050"/>
           </a:xfrm>
           <a:prstGeom prst="rect">
             <a:avLst/>
           </a:prstGeom>
-          <a:solidFill>
-            <a:srgbClr val="FFFFFF"/>
-          </a:solidFill>
+          <a:noFill/>
           <a:ln>
             <a:noFill/>
           </a:ln>
-          <a:extLst>
-            <a:ext uri="{91240B29-F687-4F45-9708-019B960494DF}">
-              <a14:hiddenLine xmlns:a14="http://schemas.microsoft.com/office/drawing/2010/main" w="6350">
-                <a:solidFill>
-                  <a:srgbClr val="000000"/>
-                </a:solidFill>
-                <a:miter lim="800000"/>
-                <a:headEnd/>
-                <a:tailEnd/>
-              </a14:hiddenLine>
-            </a:ext>
-          </a:extLst>
         </p:spPr>
         <p:txBody>
           <a:bodyPr vert="horz" wrap="square" lIns="91440" tIns="45720" rIns="91440" bIns="45720" numCol="1" anchor="t" anchorCtr="0" compatLnSpc="1">
@@ -4350,8 +4516,8 @@
         </p:nvSpPr>
         <p:spPr bwMode="auto">
           <a:xfrm rot="16200000">
-            <a:off x="-107502" y="3303836"/>
-            <a:ext cx="2225627" cy="250326"/>
+            <a:off x="-426681" y="3556680"/>
+            <a:ext cx="2505127" cy="222416"/>
           </a:xfrm>
           <a:prstGeom prst="rect">
             <a:avLst/>
@@ -4405,7 +4571,7 @@
               <a:tabLst/>
             </a:pPr>
             <a:r>
-              <a:rPr kumimoji="0" lang="en-US" altLang="en-US" sz="1200" b="1" i="0" u="none" strike="noStrike" cap="none" normalizeH="0" baseline="0" dirty="0">
+              <a:rPr kumimoji="0" lang="en-US" altLang="en-US" sz="1600" b="1" i="0" u="none" strike="noStrike" cap="none" normalizeH="0" baseline="0" dirty="0">
                 <a:ln>
                   <a:noFill/>
                 </a:ln>
@@ -4419,7 +4585,7 @@
               </a:rPr>
               <a:t>Percent antibody positive</a:t>
             </a:r>
-            <a:endParaRPr kumimoji="0" lang="en-US" altLang="en-US" sz="2000" b="1" i="0" u="none" strike="noStrike" cap="none" normalizeH="0" baseline="0" dirty="0">
+            <a:endParaRPr kumimoji="0" lang="en-US" altLang="en-US" sz="2800" b="1" i="0" u="none" strike="noStrike" cap="none" normalizeH="0" baseline="0" dirty="0">
               <a:ln>
                 <a:noFill/>
               </a:ln>
@@ -4448,8 +4614,8 @@
         </p:nvSpPr>
         <p:spPr bwMode="auto">
           <a:xfrm>
-            <a:off x="7303617" y="1765146"/>
-            <a:ext cx="2879840" cy="1582738"/>
+            <a:off x="8382637" y="1221949"/>
+            <a:ext cx="2879840" cy="1983200"/>
           </a:xfrm>
           <a:prstGeom prst="rect">
             <a:avLst/>
@@ -4498,7 +4664,7 @@
               <a:tabLst/>
             </a:pPr>
             <a:r>
-              <a:rPr kumimoji="0" lang="en-US" altLang="en-US" sz="1100" b="0" i="0" u="none" strike="noStrike" cap="none" normalizeH="0" baseline="0" dirty="0">
+              <a:rPr kumimoji="0" lang="en-US" altLang="en-US" sz="1200" b="1" i="0" u="none" strike="noStrike" cap="none" normalizeH="0" baseline="0" dirty="0">
                 <a:ln>
                   <a:noFill/>
                 </a:ln>
@@ -4530,7 +4696,7 @@
               <a:buNone/>
               <a:tabLst/>
             </a:pPr>
-            <a:endParaRPr lang="en-US" altLang="en-US" sz="1100" dirty="0">
+            <a:endParaRPr lang="en-US" altLang="en-US" sz="1200" b="1" dirty="0">
               <a:latin typeface="Calibri" panose="020F0502020204030204" pitchFamily="34" charset="0"/>
               <a:ea typeface="Calibri" panose="020F0502020204030204" pitchFamily="34" charset="0"/>
               <a:cs typeface="Times New Roman" panose="02020603050405020304" pitchFamily="18" charset="0"/>
@@ -4553,7 +4719,7 @@
               <a:buNone/>
               <a:tabLst/>
             </a:pPr>
-            <a:endParaRPr kumimoji="0" lang="en-US" altLang="en-US" sz="1100" b="0" i="0" u="none" strike="noStrike" cap="none" normalizeH="0" baseline="0" dirty="0">
+            <a:endParaRPr kumimoji="0" lang="en-US" altLang="en-US" sz="1200" b="1" i="0" u="none" strike="noStrike" cap="none" normalizeH="0" baseline="0" dirty="0">
               <a:ln>
                 <a:noFill/>
               </a:ln>
@@ -4583,7 +4749,7 @@
               <a:buNone/>
               <a:tabLst/>
             </a:pPr>
-            <a:endParaRPr lang="en-US" altLang="en-US" sz="1100" dirty="0">
+            <a:endParaRPr lang="en-US" altLang="en-US" sz="1200" b="1" dirty="0">
               <a:latin typeface="Calibri" panose="020F0502020204030204" pitchFamily="34" charset="0"/>
               <a:ea typeface="Calibri" panose="020F0502020204030204" pitchFamily="34" charset="0"/>
               <a:cs typeface="Times New Roman" panose="02020603050405020304" pitchFamily="18" charset="0"/>
@@ -4606,7 +4772,7 @@
               <a:buNone/>
               <a:tabLst/>
             </a:pPr>
-            <a:endParaRPr lang="en-US" altLang="en-US" sz="1100" dirty="0">
+            <a:endParaRPr lang="en-US" altLang="en-US" sz="1200" b="1" dirty="0">
               <a:latin typeface="Calibri" panose="020F0502020204030204" pitchFamily="34" charset="0"/>
               <a:ea typeface="Calibri" panose="020F0502020204030204" pitchFamily="34" charset="0"/>
               <a:cs typeface="Times New Roman" panose="02020603050405020304" pitchFamily="18" charset="0"/>
@@ -4629,7 +4795,7 @@
               <a:buNone/>
               <a:tabLst/>
             </a:pPr>
-            <a:endParaRPr lang="en-US" altLang="en-US" sz="1100" dirty="0">
+            <a:endParaRPr lang="en-US" altLang="en-US" sz="1200" b="1" dirty="0">
               <a:latin typeface="Calibri" panose="020F0502020204030204" pitchFamily="34" charset="0"/>
               <a:ea typeface="Calibri" panose="020F0502020204030204" pitchFamily="34" charset="0"/>
               <a:cs typeface="Times New Roman" panose="02020603050405020304" pitchFamily="18" charset="0"/>
@@ -4652,7 +4818,7 @@
               <a:buNone/>
               <a:tabLst/>
             </a:pPr>
-            <a:endParaRPr kumimoji="0" lang="en-US" altLang="en-US" sz="1100" b="0" i="0" u="none" strike="noStrike" cap="none" normalizeH="0" baseline="0" dirty="0">
+            <a:endParaRPr kumimoji="0" lang="en-US" altLang="en-US" sz="1200" b="1" i="0" u="none" strike="noStrike" cap="none" normalizeH="0" baseline="0" dirty="0">
               <a:ln>
                 <a:noFill/>
               </a:ln>
@@ -4682,7 +4848,7 @@
               <a:buNone/>
               <a:tabLst/>
             </a:pPr>
-            <a:endParaRPr kumimoji="0" lang="en-US" altLang="en-US" sz="800" b="0" i="0" u="none" strike="noStrike" cap="none" normalizeH="0" baseline="0" dirty="0">
+            <a:endParaRPr kumimoji="0" lang="en-US" altLang="en-US" sz="900" b="1" i="0" u="none" strike="noStrike" cap="none" normalizeH="0" baseline="0" dirty="0">
               <a:ln>
                 <a:noFill/>
               </a:ln>
@@ -4710,7 +4876,7 @@
               <a:tabLst/>
             </a:pPr>
             <a:r>
-              <a:rPr kumimoji="0" lang="en-US" altLang="en-US" sz="1100" b="0" i="0" u="none" strike="noStrike" cap="none" normalizeH="0" baseline="0" dirty="0">
+              <a:rPr kumimoji="0" lang="en-US" altLang="en-US" sz="1200" b="1" i="0" u="none" strike="noStrike" cap="none" normalizeH="0" baseline="0" dirty="0">
                 <a:ln>
                   <a:noFill/>
                 </a:ln>
@@ -4724,7 +4890,7 @@
               </a:rPr>
               <a:t>N.D.                                                          N.D. </a:t>
             </a:r>
-            <a:endParaRPr kumimoji="0" lang="en-US" altLang="en-US" sz="800" b="0" i="0" u="none" strike="noStrike" cap="none" normalizeH="0" baseline="0" dirty="0">
+            <a:endParaRPr kumimoji="0" lang="en-US" altLang="en-US" sz="900" b="1" i="0" u="none" strike="noStrike" cap="none" normalizeH="0" baseline="0" dirty="0">
               <a:ln>
                 <a:noFill/>
               </a:ln>
@@ -4850,7 +5016,7 @@
       </p:sp>
       <p:pic>
         <p:nvPicPr>
-          <p:cNvPr id="23" name="Picture 22" descr="A close up of a map&#10;&#10;Description automatically generated">
+          <p:cNvPr id="23" name="Picture 22">
             <a:extLst>
               <a:ext uri="{FF2B5EF4-FFF2-40B4-BE49-F238E27FC236}">
                 <a16:creationId xmlns:a16="http://schemas.microsoft.com/office/drawing/2014/main" id="{EA8AAE2E-0ECF-4188-BA52-06264739F80E}"/>
@@ -4862,7 +5028,7 @@
           </p:cNvPicPr>
           <p:nvPr/>
         </p:nvPicPr>
-        <p:blipFill rotWithShape="1">
+        <p:blipFill>
           <a:blip r:embed="rId2">
             <a:extLst>
               <a:ext uri="{28A0092B-C50C-407E-A947-70E740481C1C}">
@@ -4870,13 +5036,13 @@
               </a:ext>
             </a:extLst>
           </a:blip>
-          <a:srcRect t="7139"/>
+          <a:srcRect/>
           <a:stretch/>
         </p:blipFill>
         <p:spPr>
           <a:xfrm>
-            <a:off x="1373119" y="1614495"/>
-            <a:ext cx="1720941" cy="955156"/>
+            <a:off x="1165772" y="490429"/>
+            <a:ext cx="2032000" cy="1463040"/>
           </a:xfrm>
           <a:prstGeom prst="rect">
             <a:avLst/>
@@ -4890,7 +5056,7 @@
       </p:pic>
       <p:pic>
         <p:nvPicPr>
-          <p:cNvPr id="25" name="Picture 24" descr="A screenshot of a cell phone&#10;&#10;Description automatically generated">
+          <p:cNvPr id="25" name="Picture 24">
             <a:extLst>
               <a:ext uri="{FF2B5EF4-FFF2-40B4-BE49-F238E27FC236}">
                 <a16:creationId xmlns:a16="http://schemas.microsoft.com/office/drawing/2014/main" id="{0CC3A66E-2FA8-46EC-9FA1-EF2AA0A45822}"/>
@@ -4902,7 +5068,7 @@
           </p:cNvPicPr>
           <p:nvPr/>
         </p:nvPicPr>
-        <p:blipFill rotWithShape="1">
+        <p:blipFill>
           <a:blip r:embed="rId3">
             <a:extLst>
               <a:ext uri="{28A0092B-C50C-407E-A947-70E740481C1C}">
@@ -4910,13 +5076,13 @@
               </a:ext>
             </a:extLst>
           </a:blip>
-          <a:srcRect t="6949"/>
+          <a:srcRect/>
           <a:stretch/>
         </p:blipFill>
         <p:spPr>
           <a:xfrm>
-            <a:off x="1373120" y="2735884"/>
-            <a:ext cx="1720941" cy="955156"/>
+            <a:off x="1167458" y="2002140"/>
+            <a:ext cx="2032000" cy="1463040"/>
           </a:xfrm>
           <a:prstGeom prst="rect">
             <a:avLst/>
@@ -4930,7 +5096,7 @@
       </p:pic>
       <p:pic>
         <p:nvPicPr>
-          <p:cNvPr id="27" name="Picture 26" descr="A screenshot of a cell phone&#10;&#10;Description automatically generated">
+          <p:cNvPr id="27" name="Picture 26">
             <a:extLst>
               <a:ext uri="{FF2B5EF4-FFF2-40B4-BE49-F238E27FC236}">
                 <a16:creationId xmlns:a16="http://schemas.microsoft.com/office/drawing/2014/main" id="{01948EDF-02E8-446C-B3C1-2E1B23B3FA36}"/>
@@ -4942,7 +5108,7 @@
           </p:cNvPicPr>
           <p:nvPr/>
         </p:nvPicPr>
-        <p:blipFill rotWithShape="1">
+        <p:blipFill>
           <a:blip r:embed="rId4">
             <a:extLst>
               <a:ext uri="{28A0092B-C50C-407E-A947-70E740481C1C}">
@@ -4950,13 +5116,13 @@
               </a:ext>
             </a:extLst>
           </a:blip>
-          <a:srcRect t="6949"/>
+          <a:srcRect/>
           <a:stretch/>
         </p:blipFill>
         <p:spPr>
           <a:xfrm>
-            <a:off x="1373139" y="3882795"/>
-            <a:ext cx="1720941" cy="955156"/>
+            <a:off x="1162934" y="3540724"/>
+            <a:ext cx="2032000" cy="1463040"/>
           </a:xfrm>
           <a:prstGeom prst="rect">
             <a:avLst/>
@@ -4970,7 +5136,7 @@
       </p:pic>
       <p:pic>
         <p:nvPicPr>
-          <p:cNvPr id="29" name="Picture 28" descr="A screenshot of a cell phone&#10;&#10;Description automatically generated">
+          <p:cNvPr id="29" name="Picture 28">
             <a:extLst>
               <a:ext uri="{FF2B5EF4-FFF2-40B4-BE49-F238E27FC236}">
                 <a16:creationId xmlns:a16="http://schemas.microsoft.com/office/drawing/2014/main" id="{5F8A731F-8CAA-4701-A927-838439B7AA5F}"/>
@@ -4982,7 +5148,7 @@
           </p:cNvPicPr>
           <p:nvPr/>
         </p:nvPicPr>
-        <p:blipFill rotWithShape="1">
+        <p:blipFill>
           <a:blip r:embed="rId5">
             <a:extLst>
               <a:ext uri="{28A0092B-C50C-407E-A947-70E740481C1C}">
@@ -4990,13 +5156,13 @@
               </a:ext>
             </a:extLst>
           </a:blip>
-          <a:srcRect t="7575"/>
+          <a:srcRect/>
           <a:stretch/>
         </p:blipFill>
         <p:spPr>
           <a:xfrm>
-            <a:off x="1373120" y="4993427"/>
-            <a:ext cx="1732582" cy="955156"/>
+            <a:off x="1162934" y="5085618"/>
+            <a:ext cx="2032000" cy="1463040"/>
           </a:xfrm>
           <a:prstGeom prst="rect">
             <a:avLst/>
@@ -5010,7 +5176,7 @@
       </p:pic>
       <p:pic>
         <p:nvPicPr>
-          <p:cNvPr id="31" name="Picture 30" descr="A close up of a map&#10;&#10;Description automatically generated">
+          <p:cNvPr id="31" name="Picture 30">
             <a:extLst>
               <a:ext uri="{FF2B5EF4-FFF2-40B4-BE49-F238E27FC236}">
                 <a16:creationId xmlns:a16="http://schemas.microsoft.com/office/drawing/2014/main" id="{66F99983-7C48-4969-A1A4-033088B97E5C}"/>
@@ -5018,11 +5184,11 @@
             </a:extLst>
           </p:cNvPr>
           <p:cNvPicPr>
-            <a:picLocks noChangeAspect="1"/>
+            <a:picLocks/>
           </p:cNvPicPr>
           <p:nvPr/>
         </p:nvPicPr>
-        <p:blipFill rotWithShape="1">
+        <p:blipFill>
           <a:blip r:embed="rId6">
             <a:extLst>
               <a:ext uri="{28A0092B-C50C-407E-A947-70E740481C1C}">
@@ -5030,13 +5196,13 @@
               </a:ext>
             </a:extLst>
           </a:blip>
-          <a:srcRect t="6949"/>
+          <a:srcRect/>
           <a:stretch/>
         </p:blipFill>
         <p:spPr>
           <a:xfrm>
-            <a:off x="3197008" y="1612745"/>
-            <a:ext cx="1720941" cy="955156"/>
+            <a:off x="3298000" y="493796"/>
+            <a:ext cx="2029968" cy="1463040"/>
           </a:xfrm>
           <a:prstGeom prst="rect">
             <a:avLst/>
@@ -5050,7 +5216,7 @@
       </p:pic>
       <p:pic>
         <p:nvPicPr>
-          <p:cNvPr id="33" name="Picture 32" descr="A screenshot of a cell phone&#10;&#10;Description automatically generated">
+          <p:cNvPr id="33" name="Picture 32">
             <a:extLst>
               <a:ext uri="{FF2B5EF4-FFF2-40B4-BE49-F238E27FC236}">
                 <a16:creationId xmlns:a16="http://schemas.microsoft.com/office/drawing/2014/main" id="{8AA4992C-EB4E-4C54-A444-C8A6D07BF4C1}"/>
@@ -5058,11 +5224,11 @@
             </a:extLst>
           </p:cNvPr>
           <p:cNvPicPr>
-            <a:picLocks noChangeAspect="1"/>
+            <a:picLocks/>
           </p:cNvPicPr>
           <p:nvPr/>
         </p:nvPicPr>
-        <p:blipFill rotWithShape="1">
+        <p:blipFill>
           <a:blip r:embed="rId7">
             <a:extLst>
               <a:ext uri="{28A0092B-C50C-407E-A947-70E740481C1C}">
@@ -5070,13 +5236,13 @@
               </a:ext>
             </a:extLst>
           </a:blip>
-          <a:srcRect t="6949"/>
+          <a:srcRect/>
           <a:stretch/>
         </p:blipFill>
         <p:spPr>
           <a:xfrm>
-            <a:off x="3191277" y="2741816"/>
-            <a:ext cx="1720941" cy="955156"/>
+            <a:off x="3303734" y="2007125"/>
+            <a:ext cx="2029968" cy="1463040"/>
           </a:xfrm>
           <a:prstGeom prst="rect">
             <a:avLst/>
@@ -5090,7 +5256,7 @@
       </p:pic>
       <p:pic>
         <p:nvPicPr>
-          <p:cNvPr id="35" name="Picture 34" descr="A screenshot of a cell phone&#10;&#10;Description automatically generated">
+          <p:cNvPr id="35" name="Picture 34">
             <a:extLst>
               <a:ext uri="{FF2B5EF4-FFF2-40B4-BE49-F238E27FC236}">
                 <a16:creationId xmlns:a16="http://schemas.microsoft.com/office/drawing/2014/main" id="{1CCDA832-CC23-42AC-B646-75F13DF34697}"/>
@@ -5098,11 +5264,11 @@
             </a:extLst>
           </p:cNvPr>
           <p:cNvPicPr>
-            <a:picLocks noChangeAspect="1"/>
+            <a:picLocks/>
           </p:cNvPicPr>
           <p:nvPr/>
         </p:nvPicPr>
-        <p:blipFill rotWithShape="1">
+        <p:blipFill>
           <a:blip r:embed="rId8">
             <a:extLst>
               <a:ext uri="{28A0092B-C50C-407E-A947-70E740481C1C}">
@@ -5110,13 +5276,13 @@
               </a:ext>
             </a:extLst>
           </a:blip>
-          <a:srcRect t="6949"/>
+          <a:srcRect/>
           <a:stretch/>
         </p:blipFill>
         <p:spPr>
           <a:xfrm>
-            <a:off x="3191277" y="3877295"/>
-            <a:ext cx="1720941" cy="955156"/>
+            <a:off x="3298000" y="3537253"/>
+            <a:ext cx="2029968" cy="1463040"/>
           </a:xfrm>
           <a:prstGeom prst="rect">
             <a:avLst/>
@@ -5130,7 +5296,7 @@
       </p:pic>
       <p:pic>
         <p:nvPicPr>
-          <p:cNvPr id="37" name="Picture 36" descr="A screenshot of a cell phone&#10;&#10;Description automatically generated">
+          <p:cNvPr id="37" name="Picture 36">
             <a:extLst>
               <a:ext uri="{FF2B5EF4-FFF2-40B4-BE49-F238E27FC236}">
                 <a16:creationId xmlns:a16="http://schemas.microsoft.com/office/drawing/2014/main" id="{2AE63915-848A-429D-A801-30F917FC96DE}"/>
@@ -5138,11 +5304,11 @@
             </a:extLst>
           </p:cNvPr>
           <p:cNvPicPr>
-            <a:picLocks noChangeAspect="1"/>
+            <a:picLocks/>
           </p:cNvPicPr>
           <p:nvPr/>
         </p:nvPicPr>
-        <p:blipFill rotWithShape="1">
+        <p:blipFill>
           <a:blip r:embed="rId9">
             <a:extLst>
               <a:ext uri="{28A0092B-C50C-407E-A947-70E740481C1C}">
@@ -5150,13 +5316,13 @@
               </a:ext>
             </a:extLst>
           </a:blip>
-          <a:srcRect t="6949"/>
+          <a:srcRect/>
           <a:stretch/>
         </p:blipFill>
         <p:spPr>
           <a:xfrm>
-            <a:off x="3197008" y="4999959"/>
-            <a:ext cx="1720941" cy="955156"/>
+            <a:off x="3298000" y="5075658"/>
+            <a:ext cx="2029968" cy="1463040"/>
           </a:xfrm>
           <a:prstGeom prst="rect">
             <a:avLst/>
@@ -5170,7 +5336,7 @@
       </p:pic>
       <p:pic>
         <p:nvPicPr>
-          <p:cNvPr id="39" name="Picture 38" descr="A close up of a map&#10;&#10;Description automatically generated">
+          <p:cNvPr id="39" name="Picture 38">
             <a:extLst>
               <a:ext uri="{FF2B5EF4-FFF2-40B4-BE49-F238E27FC236}">
                 <a16:creationId xmlns:a16="http://schemas.microsoft.com/office/drawing/2014/main" id="{ABA76DB3-69AE-45F8-8F6E-8EDA399D0D79}"/>
@@ -5178,11 +5344,11 @@
             </a:extLst>
           </p:cNvPr>
           <p:cNvPicPr>
-            <a:picLocks noChangeAspect="1"/>
+            <a:picLocks/>
           </p:cNvPicPr>
           <p:nvPr/>
         </p:nvPicPr>
-        <p:blipFill rotWithShape="1">
+        <p:blipFill>
           <a:blip r:embed="rId10">
             <a:extLst>
               <a:ext uri="{28A0092B-C50C-407E-A947-70E740481C1C}">
@@ -5190,13 +5356,13 @@
               </a:ext>
             </a:extLst>
           </a:blip>
-          <a:srcRect t="6949"/>
+          <a:srcRect/>
           <a:stretch/>
         </p:blipFill>
         <p:spPr>
           <a:xfrm>
-            <a:off x="5020897" y="1612745"/>
-            <a:ext cx="1720941" cy="955156"/>
+            <a:off x="5430778" y="493796"/>
+            <a:ext cx="2029968" cy="1463040"/>
           </a:xfrm>
           <a:prstGeom prst="rect">
             <a:avLst/>
@@ -5210,7 +5376,7 @@
       </p:pic>
       <p:pic>
         <p:nvPicPr>
-          <p:cNvPr id="41" name="Picture 40" descr="A screenshot of a cell phone&#10;&#10;Description automatically generated">
+          <p:cNvPr id="41" name="Picture 40">
             <a:extLst>
               <a:ext uri="{FF2B5EF4-FFF2-40B4-BE49-F238E27FC236}">
                 <a16:creationId xmlns:a16="http://schemas.microsoft.com/office/drawing/2014/main" id="{BA79D82C-2DBB-47D1-B7DC-2BE08AA356F6}"/>
@@ -5218,11 +5384,11 @@
             </a:extLst>
           </p:cNvPr>
           <p:cNvPicPr>
-            <a:picLocks noChangeAspect="1"/>
+            <a:picLocks/>
           </p:cNvPicPr>
           <p:nvPr/>
         </p:nvPicPr>
-        <p:blipFill rotWithShape="1">
+        <p:blipFill>
           <a:blip r:embed="rId11">
             <a:extLst>
               <a:ext uri="{28A0092B-C50C-407E-A947-70E740481C1C}">
@@ -5230,13 +5396,13 @@
               </a:ext>
             </a:extLst>
           </a:blip>
-          <a:srcRect t="6949"/>
+          <a:srcRect/>
           <a:stretch/>
         </p:blipFill>
         <p:spPr>
           <a:xfrm>
-            <a:off x="5020897" y="2744917"/>
-            <a:ext cx="1720941" cy="955156"/>
+            <a:off x="5430778" y="2026671"/>
+            <a:ext cx="2029968" cy="1463040"/>
           </a:xfrm>
           <a:prstGeom prst="rect">
             <a:avLst/>
@@ -5250,7 +5416,7 @@
       </p:pic>
       <p:pic>
         <p:nvPicPr>
-          <p:cNvPr id="43" name="Picture 42" descr="A screenshot of a cell phone&#10;&#10;Description automatically generated">
+          <p:cNvPr id="43" name="Picture 42">
             <a:extLst>
               <a:ext uri="{FF2B5EF4-FFF2-40B4-BE49-F238E27FC236}">
                 <a16:creationId xmlns:a16="http://schemas.microsoft.com/office/drawing/2014/main" id="{9B74CC8E-6E51-4B6B-9206-1DD5034F7677}"/>
@@ -5258,11 +5424,11 @@
             </a:extLst>
           </p:cNvPr>
           <p:cNvPicPr>
-            <a:picLocks noChangeAspect="1"/>
+            <a:picLocks/>
           </p:cNvPicPr>
           <p:nvPr/>
         </p:nvPicPr>
-        <p:blipFill rotWithShape="1">
+        <p:blipFill>
           <a:blip r:embed="rId12">
             <a:extLst>
               <a:ext uri="{28A0092B-C50C-407E-A947-70E740481C1C}">
@@ -5270,13 +5436,13 @@
               </a:ext>
             </a:extLst>
           </a:blip>
-          <a:srcRect t="6949"/>
+          <a:srcRect/>
           <a:stretch/>
         </p:blipFill>
         <p:spPr>
           <a:xfrm>
-            <a:off x="4994773" y="3880145"/>
-            <a:ext cx="1720941" cy="955156"/>
+            <a:off x="5430778" y="3542783"/>
+            <a:ext cx="2029968" cy="1463040"/>
           </a:xfrm>
           <a:prstGeom prst="rect">
             <a:avLst/>
@@ -5290,7 +5456,7 @@
       </p:pic>
       <p:pic>
         <p:nvPicPr>
-          <p:cNvPr id="47" name="Picture 46" descr="A screenshot of a cell phone&#10;&#10;Description automatically generated">
+          <p:cNvPr id="47" name="Picture 46">
             <a:extLst>
               <a:ext uri="{FF2B5EF4-FFF2-40B4-BE49-F238E27FC236}">
                 <a16:creationId xmlns:a16="http://schemas.microsoft.com/office/drawing/2014/main" id="{38A8C395-BF90-4DE4-B13C-0546BDC8C952}"/>
@@ -5298,11 +5464,11 @@
             </a:extLst>
           </p:cNvPr>
           <p:cNvPicPr>
-            <a:picLocks noChangeAspect="1"/>
+            <a:picLocks/>
           </p:cNvPicPr>
           <p:nvPr/>
         </p:nvPicPr>
-        <p:blipFill rotWithShape="1">
+        <p:blipFill>
           <a:blip r:embed="rId13">
             <a:extLst>
               <a:ext uri="{28A0092B-C50C-407E-A947-70E740481C1C}">
@@ -5310,13 +5476,13 @@
               </a:ext>
             </a:extLst>
           </a:blip>
-          <a:srcRect t="6949"/>
+          <a:srcRect/>
           <a:stretch/>
         </p:blipFill>
         <p:spPr>
           <a:xfrm>
-            <a:off x="4997548" y="4993427"/>
-            <a:ext cx="1720941" cy="955156"/>
+            <a:off x="5419592" y="5075658"/>
+            <a:ext cx="2029968" cy="1463040"/>
           </a:xfrm>
           <a:prstGeom prst="rect">
             <a:avLst/>
@@ -5330,7 +5496,7 @@
       </p:pic>
       <p:pic>
         <p:nvPicPr>
-          <p:cNvPr id="49" name="Picture 48" descr="A screenshot of a cell phone&#10;&#10;Description automatically generated">
+          <p:cNvPr id="49" name="Picture 48">
             <a:extLst>
               <a:ext uri="{FF2B5EF4-FFF2-40B4-BE49-F238E27FC236}">
                 <a16:creationId xmlns:a16="http://schemas.microsoft.com/office/drawing/2014/main" id="{41A2F3C5-C66C-426B-81D6-F90364F3C732}"/>
@@ -5338,11 +5504,11 @@
             </a:extLst>
           </p:cNvPr>
           <p:cNvPicPr>
-            <a:picLocks noChangeAspect="1"/>
+            <a:picLocks/>
           </p:cNvPicPr>
           <p:nvPr/>
         </p:nvPicPr>
-        <p:blipFill rotWithShape="1">
+        <p:blipFill>
           <a:blip r:embed="rId14">
             <a:extLst>
               <a:ext uri="{28A0092B-C50C-407E-A947-70E740481C1C}">
@@ -5350,13 +5516,13 @@
               </a:ext>
             </a:extLst>
           </a:blip>
-          <a:srcRect t="6949"/>
+          <a:srcRect/>
           <a:stretch/>
         </p:blipFill>
         <p:spPr>
           <a:xfrm>
-            <a:off x="6815686" y="3877295"/>
-            <a:ext cx="1720941" cy="955156"/>
+            <a:off x="7541184" y="3548404"/>
+            <a:ext cx="2029968" cy="1463040"/>
           </a:xfrm>
           <a:prstGeom prst="rect">
             <a:avLst/>
@@ -5370,7 +5536,7 @@
       </p:pic>
       <p:pic>
         <p:nvPicPr>
-          <p:cNvPr id="51" name="Picture 50" descr="A screenshot of a cell phone&#10;&#10;Description automatically generated">
+          <p:cNvPr id="51" name="Picture 50">
             <a:extLst>
               <a:ext uri="{FF2B5EF4-FFF2-40B4-BE49-F238E27FC236}">
                 <a16:creationId xmlns:a16="http://schemas.microsoft.com/office/drawing/2014/main" id="{51E946A7-7F64-4D10-906B-E8828DC3D32C}"/>
@@ -5378,11 +5544,11 @@
             </a:extLst>
           </p:cNvPr>
           <p:cNvPicPr>
-            <a:picLocks noChangeAspect="1"/>
+            <a:picLocks/>
           </p:cNvPicPr>
           <p:nvPr/>
         </p:nvPicPr>
-        <p:blipFill rotWithShape="1">
+        <p:blipFill>
           <a:blip r:embed="rId15">
             <a:extLst>
               <a:ext uri="{28A0092B-C50C-407E-A947-70E740481C1C}">
@@ -5390,13 +5556,13 @@
               </a:ext>
             </a:extLst>
           </a:blip>
-          <a:srcRect t="6949"/>
+          <a:srcRect/>
           <a:stretch/>
         </p:blipFill>
         <p:spPr>
           <a:xfrm>
-            <a:off x="8633824" y="3877295"/>
-            <a:ext cx="1720941" cy="955156"/>
+            <a:off x="9651590" y="3548404"/>
+            <a:ext cx="2029968" cy="1463040"/>
           </a:xfrm>
           <a:prstGeom prst="rect">
             <a:avLst/>
@@ -5410,7 +5576,7 @@
       </p:pic>
       <p:pic>
         <p:nvPicPr>
-          <p:cNvPr id="53" name="Picture 52" descr="A screenshot of a cell phone&#10;&#10;Description automatically generated">
+          <p:cNvPr id="53" name="Picture 52">
             <a:extLst>
               <a:ext uri="{FF2B5EF4-FFF2-40B4-BE49-F238E27FC236}">
                 <a16:creationId xmlns:a16="http://schemas.microsoft.com/office/drawing/2014/main" id="{B96EBF99-447E-4380-A2F2-466158187713}"/>
@@ -5418,11 +5584,11 @@
             </a:extLst>
           </p:cNvPr>
           <p:cNvPicPr>
-            <a:picLocks noChangeAspect="1"/>
+            <a:picLocks/>
           </p:cNvPicPr>
           <p:nvPr/>
         </p:nvPicPr>
-        <p:blipFill rotWithShape="1">
+        <p:blipFill>
           <a:blip r:embed="rId16">
             <a:extLst>
               <a:ext uri="{28A0092B-C50C-407E-A947-70E740481C1C}">
@@ -5430,13 +5596,13 @@
               </a:ext>
             </a:extLst>
           </a:blip>
-          <a:srcRect t="6949"/>
+          <a:srcRect/>
           <a:stretch/>
         </p:blipFill>
         <p:spPr>
           <a:xfrm>
-            <a:off x="6809795" y="4993427"/>
-            <a:ext cx="1720941" cy="955156"/>
+            <a:off x="7541184" y="5075658"/>
+            <a:ext cx="2029968" cy="1463040"/>
           </a:xfrm>
           <a:prstGeom prst="rect">
             <a:avLst/>
@@ -5450,7 +5616,7 @@
       </p:pic>
       <p:pic>
         <p:nvPicPr>
-          <p:cNvPr id="55" name="Picture 54" descr="A screenshot of a cell phone&#10;&#10;Description automatically generated">
+          <p:cNvPr id="55" name="Picture 54">
             <a:extLst>
               <a:ext uri="{FF2B5EF4-FFF2-40B4-BE49-F238E27FC236}">
                 <a16:creationId xmlns:a16="http://schemas.microsoft.com/office/drawing/2014/main" id="{E72344B8-CA4D-487E-8773-FD470DE86C4D}"/>
@@ -5458,11 +5624,11 @@
             </a:extLst>
           </p:cNvPr>
           <p:cNvPicPr>
-            <a:picLocks noChangeAspect="1"/>
+            <a:picLocks/>
           </p:cNvPicPr>
           <p:nvPr/>
         </p:nvPicPr>
-        <p:blipFill rotWithShape="1">
+        <p:blipFill>
           <a:blip r:embed="rId17">
             <a:extLst>
               <a:ext uri="{28A0092B-C50C-407E-A947-70E740481C1C}">
@@ -5470,13 +5636,13 @@
               </a:ext>
             </a:extLst>
           </a:blip>
-          <a:srcRect t="6949"/>
+          <a:srcRect/>
           <a:stretch/>
         </p:blipFill>
         <p:spPr>
           <a:xfrm>
-            <a:off x="8633824" y="4999959"/>
-            <a:ext cx="1720941" cy="955156"/>
+            <a:off x="9658928" y="5075658"/>
+            <a:ext cx="2029968" cy="1463040"/>
           </a:xfrm>
           <a:prstGeom prst="rect">
             <a:avLst/>

</xml_diff>

<commit_message>
adding code and files for Fig 2
</commit_message>
<xml_diff>
--- a/docs/Figure3_draft_JR.pptx
+++ b/docs/Figure3_draft_JR.pptx
@@ -259,7 +259,7 @@
           <a:p>
             <a:fld id="{F0A330B3-BC67-49E1-B664-0390434B4135}" type="datetimeFigureOut">
               <a:rPr lang="en-US" smtClean="0"/>
-              <a:t>5/13/2020</a:t>
+              <a:t>5/18/2020</a:t>
             </a:fld>
             <a:endParaRPr lang="en-US"/>
           </a:p>
@@ -457,7 +457,7 @@
           <a:p>
             <a:fld id="{F0A330B3-BC67-49E1-B664-0390434B4135}" type="datetimeFigureOut">
               <a:rPr lang="en-US" smtClean="0"/>
-              <a:t>5/13/2020</a:t>
+              <a:t>5/18/2020</a:t>
             </a:fld>
             <a:endParaRPr lang="en-US"/>
           </a:p>
@@ -665,7 +665,7 @@
           <a:p>
             <a:fld id="{F0A330B3-BC67-49E1-B664-0390434B4135}" type="datetimeFigureOut">
               <a:rPr lang="en-US" smtClean="0"/>
-              <a:t>5/13/2020</a:t>
+              <a:t>5/18/2020</a:t>
             </a:fld>
             <a:endParaRPr lang="en-US"/>
           </a:p>
@@ -863,7 +863,7 @@
           <a:p>
             <a:fld id="{F0A330B3-BC67-49E1-B664-0390434B4135}" type="datetimeFigureOut">
               <a:rPr lang="en-US" smtClean="0"/>
-              <a:t>5/13/2020</a:t>
+              <a:t>5/18/2020</a:t>
             </a:fld>
             <a:endParaRPr lang="en-US"/>
           </a:p>
@@ -1138,7 +1138,7 @@
           <a:p>
             <a:fld id="{F0A330B3-BC67-49E1-B664-0390434B4135}" type="datetimeFigureOut">
               <a:rPr lang="en-US" smtClean="0"/>
-              <a:t>5/13/2020</a:t>
+              <a:t>5/18/2020</a:t>
             </a:fld>
             <a:endParaRPr lang="en-US"/>
           </a:p>
@@ -1403,7 +1403,7 @@
           <a:p>
             <a:fld id="{F0A330B3-BC67-49E1-B664-0390434B4135}" type="datetimeFigureOut">
               <a:rPr lang="en-US" smtClean="0"/>
-              <a:t>5/13/2020</a:t>
+              <a:t>5/18/2020</a:t>
             </a:fld>
             <a:endParaRPr lang="en-US"/>
           </a:p>
@@ -1815,7 +1815,7 @@
           <a:p>
             <a:fld id="{F0A330B3-BC67-49E1-B664-0390434B4135}" type="datetimeFigureOut">
               <a:rPr lang="en-US" smtClean="0"/>
-              <a:t>5/13/2020</a:t>
+              <a:t>5/18/2020</a:t>
             </a:fld>
             <a:endParaRPr lang="en-US"/>
           </a:p>
@@ -1956,7 +1956,7 @@
           <a:p>
             <a:fld id="{F0A330B3-BC67-49E1-B664-0390434B4135}" type="datetimeFigureOut">
               <a:rPr lang="en-US" smtClean="0"/>
-              <a:t>5/13/2020</a:t>
+              <a:t>5/18/2020</a:t>
             </a:fld>
             <a:endParaRPr lang="en-US"/>
           </a:p>
@@ -2069,7 +2069,7 @@
           <a:p>
             <a:fld id="{F0A330B3-BC67-49E1-B664-0390434B4135}" type="datetimeFigureOut">
               <a:rPr lang="en-US" smtClean="0"/>
-              <a:t>5/13/2020</a:t>
+              <a:t>5/18/2020</a:t>
             </a:fld>
             <a:endParaRPr lang="en-US"/>
           </a:p>
@@ -2380,7 +2380,7 @@
           <a:p>
             <a:fld id="{F0A330B3-BC67-49E1-B664-0390434B4135}" type="datetimeFigureOut">
               <a:rPr lang="en-US" smtClean="0"/>
-              <a:t>5/13/2020</a:t>
+              <a:t>5/18/2020</a:t>
             </a:fld>
             <a:endParaRPr lang="en-US"/>
           </a:p>
@@ -2668,7 +2668,7 @@
           <a:p>
             <a:fld id="{F0A330B3-BC67-49E1-B664-0390434B4135}" type="datetimeFigureOut">
               <a:rPr lang="en-US" smtClean="0"/>
-              <a:t>5/13/2020</a:t>
+              <a:t>5/18/2020</a:t>
             </a:fld>
             <a:endParaRPr lang="en-US"/>
           </a:p>
@@ -2909,7 +2909,7 @@
           <a:p>
             <a:fld id="{F0A330B3-BC67-49E1-B664-0390434B4135}" type="datetimeFigureOut">
               <a:rPr lang="en-US" smtClean="0"/>
-              <a:t>5/13/2020</a:t>
+              <a:t>5/18/2020</a:t>
             </a:fld>
             <a:endParaRPr lang="en-US"/>
           </a:p>
@@ -3420,8 +3420,8 @@
         </p:nvSpPr>
         <p:spPr bwMode="auto">
           <a:xfrm>
-            <a:off x="1148180" y="103164"/>
-            <a:ext cx="10315752" cy="418250"/>
+            <a:off x="946724" y="87621"/>
+            <a:ext cx="10742165" cy="418250"/>
           </a:xfrm>
           <a:prstGeom prst="rect">
             <a:avLst/>
@@ -3482,7 +3482,7 @@
                 <a:ea typeface="Calibri" panose="020F0502020204030204" pitchFamily="34" charset="0"/>
                 <a:cs typeface="Times New Roman" panose="02020603050405020304" pitchFamily="18" charset="0"/>
               </a:rPr>
-              <a:t>                    Pgp3 MBA                                      CT694                                        LFA Latex                             LFA Gold                                       LFA Field</a:t>
+              <a:t>                    Pgp3 MBA                                      CT694                                        LFA Latex                                    LFA Gold                                          LFA Field</a:t>
             </a:r>
             <a:endParaRPr kumimoji="0" lang="en-US" altLang="en-US" sz="1400" b="1" i="0" u="none" strike="noStrike" cap="none" normalizeH="0" baseline="0" dirty="0">
               <a:ln>
@@ -4437,7 +4437,7 @@
         </p:nvSpPr>
         <p:spPr bwMode="auto">
           <a:xfrm>
-            <a:off x="5296056" y="6581112"/>
+            <a:off x="5665333" y="6548658"/>
             <a:ext cx="1304945" cy="273050"/>
           </a:xfrm>
           <a:prstGeom prst="rect">

</xml_diff>